<commit_message>
Vanity URLs, oh my!
</commit_message>
<xml_diff>
--- a/Python Level 2/Lesson 2/Session 2.pptx
+++ b/Python Level 2/Lesson 2/Session 2.pptx
@@ -251,7 +251,7 @@
           <a:p>
             <a:fld id="{F86DE704-5A85-4041-9FC6-7273780BCBF6}" type="datetimeFigureOut">
               <a:rPr lang="en-US" smtClean="0"/>
-              <a:t>5/23/18</a:t>
+              <a:t>10/2/18</a:t>
             </a:fld>
             <a:endParaRPr lang="en-US"/>
           </a:p>
@@ -419,7 +419,7 @@
           <a:p>
             <a:fld id="{F86DE704-5A85-4041-9FC6-7273780BCBF6}" type="datetimeFigureOut">
               <a:rPr lang="en-US" smtClean="0"/>
-              <a:t>5/23/18</a:t>
+              <a:t>10/2/18</a:t>
             </a:fld>
             <a:endParaRPr lang="en-US"/>
           </a:p>
@@ -597,7 +597,7 @@
           <a:p>
             <a:fld id="{F86DE704-5A85-4041-9FC6-7273780BCBF6}" type="datetimeFigureOut">
               <a:rPr lang="en-US" smtClean="0"/>
-              <a:t>5/23/18</a:t>
+              <a:t>10/2/18</a:t>
             </a:fld>
             <a:endParaRPr lang="en-US"/>
           </a:p>
@@ -765,7 +765,7 @@
           <a:p>
             <a:fld id="{F86DE704-5A85-4041-9FC6-7273780BCBF6}" type="datetimeFigureOut">
               <a:rPr lang="en-US" smtClean="0"/>
-              <a:t>5/23/18</a:t>
+              <a:t>10/2/18</a:t>
             </a:fld>
             <a:endParaRPr lang="en-US"/>
           </a:p>
@@ -1010,7 +1010,7 @@
           <a:p>
             <a:fld id="{F86DE704-5A85-4041-9FC6-7273780BCBF6}" type="datetimeFigureOut">
               <a:rPr lang="en-US" smtClean="0"/>
-              <a:t>5/23/18</a:t>
+              <a:t>10/2/18</a:t>
             </a:fld>
             <a:endParaRPr lang="en-US"/>
           </a:p>
@@ -1239,7 +1239,7 @@
           <a:p>
             <a:fld id="{F86DE704-5A85-4041-9FC6-7273780BCBF6}" type="datetimeFigureOut">
               <a:rPr lang="en-US" smtClean="0"/>
-              <a:t>5/23/18</a:t>
+              <a:t>10/2/18</a:t>
             </a:fld>
             <a:endParaRPr lang="en-US"/>
           </a:p>
@@ -1603,7 +1603,7 @@
           <a:p>
             <a:fld id="{F86DE704-5A85-4041-9FC6-7273780BCBF6}" type="datetimeFigureOut">
               <a:rPr lang="en-US" smtClean="0"/>
-              <a:t>5/23/18</a:t>
+              <a:t>10/2/18</a:t>
             </a:fld>
             <a:endParaRPr lang="en-US"/>
           </a:p>
@@ -1720,7 +1720,7 @@
           <a:p>
             <a:fld id="{F86DE704-5A85-4041-9FC6-7273780BCBF6}" type="datetimeFigureOut">
               <a:rPr lang="en-US" smtClean="0"/>
-              <a:t>5/23/18</a:t>
+              <a:t>10/2/18</a:t>
             </a:fld>
             <a:endParaRPr lang="en-US"/>
           </a:p>
@@ -1815,7 +1815,7 @@
           <a:p>
             <a:fld id="{F86DE704-5A85-4041-9FC6-7273780BCBF6}" type="datetimeFigureOut">
               <a:rPr lang="en-US" smtClean="0"/>
-              <a:t>5/23/18</a:t>
+              <a:t>10/2/18</a:t>
             </a:fld>
             <a:endParaRPr lang="en-US"/>
           </a:p>
@@ -2090,7 +2090,7 @@
           <a:p>
             <a:fld id="{F86DE704-5A85-4041-9FC6-7273780BCBF6}" type="datetimeFigureOut">
               <a:rPr lang="en-US" smtClean="0"/>
-              <a:t>5/23/18</a:t>
+              <a:t>10/2/18</a:t>
             </a:fld>
             <a:endParaRPr lang="en-US"/>
           </a:p>
@@ -2342,7 +2342,7 @@
           <a:p>
             <a:fld id="{F86DE704-5A85-4041-9FC6-7273780BCBF6}" type="datetimeFigureOut">
               <a:rPr lang="en-US" smtClean="0"/>
-              <a:t>5/23/18</a:t>
+              <a:t>10/2/18</a:t>
             </a:fld>
             <a:endParaRPr lang="en-US"/>
           </a:p>
@@ -2553,7 +2553,7 @@
           <a:p>
             <a:fld id="{F86DE704-5A85-4041-9FC6-7273780BCBF6}" type="datetimeFigureOut">
               <a:rPr lang="en-US" smtClean="0"/>
-              <a:t>5/23/18</a:t>
+              <a:t>10/2/18</a:t>
             </a:fld>
             <a:endParaRPr lang="en-US"/>
           </a:p>
@@ -3534,36 +3534,6 @@
           </a:prstGeom>
         </p:spPr>
       </p:pic>
-      <p:sp>
-        <p:nvSpPr>
-          <p:cNvPr id="6" name="TextBox 5"/>
-          <p:cNvSpPr txBox="1"/>
-          <p:nvPr/>
-        </p:nvSpPr>
-        <p:spPr>
-          <a:xfrm>
-            <a:off x="790532" y="6127234"/>
-            <a:ext cx="10112649" cy="369332"/>
-          </a:xfrm>
-          <a:prstGeom prst="rect">
-            <a:avLst/>
-          </a:prstGeom>
-          <a:noFill/>
-        </p:spPr>
-        <p:txBody>
-          <a:bodyPr wrap="square" rtlCol="0">
-            <a:spAutoFit/>
-          </a:bodyPr>
-          <a:lstStyle/>
-          <a:p>
-            <a:pPr algn="ctr"/>
-            <a:r>
-              <a:rPr lang="en-US" strike="sngStrike" dirty="0"/>
-              <a:t>Questions? Comments? Come see us in S32, on Monday, 11:00 – 12:00</a:t>
-            </a:r>
-          </a:p>
-        </p:txBody>
-      </p:sp>
     </p:spTree>
     <p:extLst>
       <p:ext uri="{BB962C8B-B14F-4D97-AF65-F5344CB8AC3E}">
@@ -3617,100 +3587,73 @@
           </a:p>
         </p:txBody>
       </p:sp>
+      <p:sp>
+        <p:nvSpPr>
+          <p:cNvPr id="5" name="TextBox 4"/>
+          <p:cNvSpPr txBox="1"/>
+          <p:nvPr/>
+        </p:nvSpPr>
+        <p:spPr>
+          <a:xfrm>
+            <a:off x="2238114" y="5950077"/>
+            <a:ext cx="7715767" cy="523220"/>
+          </a:xfrm>
+          <a:prstGeom prst="rect">
+            <a:avLst/>
+          </a:prstGeom>
+          <a:noFill/>
+        </p:spPr>
+        <p:txBody>
+          <a:bodyPr wrap="none" rtlCol="0">
+            <a:spAutoFit/>
+          </a:bodyPr>
+          <a:lstStyle/>
+          <a:p>
+            <a:r>
+              <a:rPr lang="en-US" sz="2800" dirty="0"/>
+              <a:t>Missed Last week? http://</a:t>
+            </a:r>
+            <a:r>
+              <a:rPr lang="en-US" sz="2800" dirty="0" err="1"/>
+              <a:t>eca</a:t>
+            </a:r>
+            <a:r>
+              <a:rPr lang="en-US" sz="2800" dirty="0"/>
+              <a:t>-python/level2lesson2</a:t>
+            </a:r>
+          </a:p>
+        </p:txBody>
+      </p:sp>
       <p:pic>
         <p:nvPicPr>
-          <p:cNvPr id="7" name="Picture 6"/>
+          <p:cNvPr id="6" name="Picture 5">
+            <a:extLst>
+              <a:ext uri="{FF2B5EF4-FFF2-40B4-BE49-F238E27FC236}">
+                <a16:creationId xmlns:a16="http://schemas.microsoft.com/office/drawing/2014/main" id="{8369C7D2-0E36-E84F-84F9-1E998CE5C503}"/>
+              </a:ext>
+            </a:extLst>
+          </p:cNvPr>
           <p:cNvPicPr>
             <a:picLocks noChangeAspect="1"/>
           </p:cNvPicPr>
           <p:nvPr/>
         </p:nvPicPr>
         <p:blipFill>
-          <a:blip r:embed="rId2">
-            <a:extLst>
-              <a:ext uri="{28A0092B-C50C-407E-A947-70E740481C1C}">
-                <a14:useLocalDpi xmlns:a14="http://schemas.microsoft.com/office/drawing/2010/main" val="0"/>
-              </a:ext>
-            </a:extLst>
-          </a:blip>
+          <a:blip r:embed="rId2"/>
           <a:stretch>
             <a:fillRect/>
           </a:stretch>
         </p:blipFill>
         <p:spPr>
           <a:xfrm>
-            <a:off x="1210991" y="1652926"/>
-            <a:ext cx="9770017" cy="3747843"/>
+            <a:off x="1441046" y="1435374"/>
+            <a:ext cx="9309905" cy="4165660"/>
           </a:xfrm>
           <a:prstGeom prst="rect">
             <a:avLst/>
           </a:prstGeom>
         </p:spPr>
       </p:pic>
-      <p:pic>
-        <p:nvPicPr>
-          <p:cNvPr id="4" name="Picture 3"/>
-          <p:cNvPicPr>
-            <a:picLocks noChangeAspect="1"/>
-          </p:cNvPicPr>
-          <p:nvPr/>
-        </p:nvPicPr>
-        <p:blipFill>
-          <a:blip r:embed="rId3">
-            <a:extLst>
-              <a:ext uri="{28A0092B-C50C-407E-A947-70E740481C1C}">
-                <a14:useLocalDpi xmlns:a14="http://schemas.microsoft.com/office/drawing/2010/main" val="0"/>
-              </a:ext>
-            </a:extLst>
-          </a:blip>
-          <a:stretch>
-            <a:fillRect/>
-          </a:stretch>
-        </p:blipFill>
-        <p:spPr>
-          <a:xfrm>
-            <a:off x="9801412" y="4624575"/>
-            <a:ext cx="1552388" cy="1552388"/>
-          </a:xfrm>
-          <a:prstGeom prst="rect">
-            <a:avLst/>
-          </a:prstGeom>
-        </p:spPr>
-      </p:pic>
-      <p:sp>
-        <p:nvSpPr>
-          <p:cNvPr id="5" name="TextBox 4"/>
-          <p:cNvSpPr txBox="1"/>
-          <p:nvPr/>
-        </p:nvSpPr>
-        <p:spPr>
-          <a:xfrm>
-            <a:off x="3286223" y="5915353"/>
-            <a:ext cx="5619552" cy="523220"/>
-          </a:xfrm>
-          <a:prstGeom prst="rect">
-            <a:avLst/>
-          </a:prstGeom>
-          <a:noFill/>
-        </p:spPr>
-        <p:txBody>
-          <a:bodyPr wrap="none" rtlCol="0">
-            <a:spAutoFit/>
-          </a:bodyPr>
-          <a:lstStyle/>
-          <a:p>
-            <a:r>
-              <a:rPr lang="en-US" sz="2800" dirty="0"/>
-              <a:t>Missed Last week? http://go/</a:t>
-            </a:r>
-            <a:r>
-              <a:rPr lang="en-US" sz="2800" dirty="0" err="1"/>
-              <a:t>zxvnojrf</a:t>
-            </a:r>
-            <a:endParaRPr lang="en-US" sz="2800" dirty="0"/>
-          </a:p>
-        </p:txBody>
-      </p:sp>
     </p:spTree>
     <p:extLst>
       <p:ext uri="{BB962C8B-B14F-4D97-AF65-F5344CB8AC3E}">
@@ -4004,28 +3947,28 @@
       </p:pic>
       <p:pic>
         <p:nvPicPr>
-          <p:cNvPr id="6" name="Picture 5"/>
+          <p:cNvPr id="8" name="Picture 7">
+            <a:extLst>
+              <a:ext uri="{FF2B5EF4-FFF2-40B4-BE49-F238E27FC236}">
+                <a16:creationId xmlns:a16="http://schemas.microsoft.com/office/drawing/2014/main" id="{3F1ED81E-00D0-9D46-B0A9-A50DEB1CD877}"/>
+              </a:ext>
+            </a:extLst>
+          </p:cNvPr>
           <p:cNvPicPr>
             <a:picLocks noChangeAspect="1"/>
           </p:cNvPicPr>
           <p:nvPr/>
         </p:nvPicPr>
         <p:blipFill>
-          <a:blip r:embed="rId4">
-            <a:extLst>
-              <a:ext uri="{28A0092B-C50C-407E-A947-70E740481C1C}">
-                <a14:useLocalDpi xmlns:a14="http://schemas.microsoft.com/office/drawing/2010/main" val="0"/>
-              </a:ext>
-            </a:extLst>
-          </a:blip>
+          <a:blip r:embed="rId4"/>
           <a:stretch>
             <a:fillRect/>
           </a:stretch>
         </p:blipFill>
         <p:spPr>
           <a:xfrm>
-            <a:off x="774700" y="2298700"/>
-            <a:ext cx="10629900" cy="2247900"/>
+            <a:off x="787400" y="2257129"/>
+            <a:ext cx="10706582" cy="2299978"/>
           </a:xfrm>
           <a:prstGeom prst="rect">
             <a:avLst/>
@@ -4269,7 +4212,7 @@
         <p:spPr>
           <a:xfrm>
             <a:off x="838200" y="4624575"/>
-            <a:ext cx="8963212" cy="1754326"/>
+            <a:ext cx="8963212" cy="2308324"/>
           </a:xfrm>
           <a:prstGeom prst="rect">
             <a:avLst/>
@@ -4332,7 +4275,7 @@
             </a:pPr>
             <a:r>
               <a:rPr lang="en-US" dirty="0"/>
-              <a:t>What does the last line do?</a:t>
+              <a:t>What do the last two lines do?</a:t>
             </a:r>
           </a:p>
           <a:p>
@@ -4349,7 +4292,7 @@
             </a:pPr>
             <a:r>
               <a:rPr lang="en-US" dirty="0"/>
-              <a:t>There’s one major advantage gain by using a dictionary as a case statement. What is it?</a:t>
+              <a:t>Functions are stored in variables – just like values!</a:t>
             </a:r>
           </a:p>
           <a:p>
@@ -4359,11 +4302,34 @@
             </a:pPr>
             <a:endParaRPr lang="en-US" dirty="0"/>
           </a:p>
+          <a:p>
+            <a:pPr marL="285750" indent="-285750">
+              <a:buFont typeface="Arial" charset="0"/>
+              <a:buChar char="•"/>
+            </a:pPr>
+            <a:r>
+              <a:rPr lang="en-US" dirty="0"/>
+              <a:t>There’s one major advantage gain by using a dictionary as a case statement. What is it?</a:t>
+            </a:r>
+          </a:p>
+          <a:p>
+            <a:pPr marL="285750" indent="-285750">
+              <a:buFont typeface="Arial" charset="0"/>
+              <a:buChar char="•"/>
+            </a:pPr>
+            <a:endParaRPr lang="en-US" dirty="0"/>
+          </a:p>
         </p:txBody>
       </p:sp>
       <p:pic>
         <p:nvPicPr>
-          <p:cNvPr id="12" name="Content Placeholder 11"/>
+          <p:cNvPr id="6" name="Content Placeholder 5">
+            <a:extLst>
+              <a:ext uri="{FF2B5EF4-FFF2-40B4-BE49-F238E27FC236}">
+                <a16:creationId xmlns:a16="http://schemas.microsoft.com/office/drawing/2014/main" id="{575249D4-C99A-C74E-8F86-660900F2B6E3}"/>
+              </a:ext>
+            </a:extLst>
+          </p:cNvPr>
           <p:cNvPicPr>
             <a:picLocks noGrp="1" noChangeAspect="1"/>
           </p:cNvPicPr>
@@ -4372,21 +4338,15 @@
           </p:nvPr>
         </p:nvPicPr>
         <p:blipFill>
-          <a:blip r:embed="rId3">
-            <a:extLst>
-              <a:ext uri="{28A0092B-C50C-407E-A947-70E740481C1C}">
-                <a14:useLocalDpi xmlns:a14="http://schemas.microsoft.com/office/drawing/2010/main" val="0"/>
-              </a:ext>
-            </a:extLst>
-          </a:blip>
+          <a:blip r:embed="rId3"/>
           <a:stretch>
             <a:fillRect/>
           </a:stretch>
         </p:blipFill>
         <p:spPr>
           <a:xfrm>
-            <a:off x="838200" y="1567722"/>
-            <a:ext cx="10515600" cy="2667000"/>
+            <a:off x="838200" y="1614807"/>
+            <a:ext cx="10515600" cy="2807830"/>
           </a:xfrm>
         </p:spPr>
       </p:pic>
@@ -4445,35 +4405,6 @@
       </p:sp>
       <p:pic>
         <p:nvPicPr>
-          <p:cNvPr id="6" name="Content Placeholder 5"/>
-          <p:cNvPicPr>
-            <a:picLocks noGrp="1" noChangeAspect="1"/>
-          </p:cNvPicPr>
-          <p:nvPr>
-            <p:ph idx="1"/>
-          </p:nvPr>
-        </p:nvPicPr>
-        <p:blipFill>
-          <a:blip r:embed="rId2">
-            <a:extLst>
-              <a:ext uri="{28A0092B-C50C-407E-A947-70E740481C1C}">
-                <a14:useLocalDpi xmlns:a14="http://schemas.microsoft.com/office/drawing/2010/main" val="0"/>
-              </a:ext>
-            </a:extLst>
-          </a:blip>
-          <a:stretch>
-            <a:fillRect/>
-          </a:stretch>
-        </p:blipFill>
-        <p:spPr>
-          <a:xfrm>
-            <a:off x="838200" y="1690688"/>
-            <a:ext cx="10515600" cy="3092115"/>
-          </a:xfrm>
-        </p:spPr>
-      </p:pic>
-      <p:pic>
-        <p:nvPicPr>
           <p:cNvPr id="7" name="Picture 6"/>
           <p:cNvPicPr>
             <a:picLocks noChangeAspect="1"/>
@@ -4481,7 +4412,7 @@
           <p:nvPr/>
         </p:nvPicPr>
         <p:blipFill>
-          <a:blip r:embed="rId3">
+          <a:blip r:embed="rId2">
             <a:extLst>
               <a:ext uri="{28A0092B-C50C-407E-A947-70E740481C1C}">
                 <a14:useLocalDpi xmlns:a14="http://schemas.microsoft.com/office/drawing/2010/main" val="0"/>
@@ -4531,6 +4462,35 @@
           </a:p>
         </p:txBody>
       </p:sp>
+      <p:pic>
+        <p:nvPicPr>
+          <p:cNvPr id="8" name="Content Placeholder 7">
+            <a:extLst>
+              <a:ext uri="{FF2B5EF4-FFF2-40B4-BE49-F238E27FC236}">
+                <a16:creationId xmlns:a16="http://schemas.microsoft.com/office/drawing/2014/main" id="{B87475DA-332B-D344-B2A8-86749FB47286}"/>
+              </a:ext>
+            </a:extLst>
+          </p:cNvPr>
+          <p:cNvPicPr>
+            <a:picLocks noGrp="1" noChangeAspect="1"/>
+          </p:cNvPicPr>
+          <p:nvPr>
+            <p:ph idx="1"/>
+          </p:nvPr>
+        </p:nvPicPr>
+        <p:blipFill>
+          <a:blip r:embed="rId3"/>
+          <a:stretch>
+            <a:fillRect/>
+          </a:stretch>
+        </p:blipFill>
+        <p:spPr>
+          <a:xfrm>
+            <a:off x="838200" y="2046647"/>
+            <a:ext cx="10515600" cy="2221969"/>
+          </a:xfrm>
+        </p:spPr>
+      </p:pic>
     </p:spTree>
     <p:extLst>
       <p:ext uri="{BB962C8B-B14F-4D97-AF65-F5344CB8AC3E}">

</xml_diff>